<commit_message>
This PR fixes a BUG in cohort intersect
Bug fix https://github.com/OHDSI/CohortAlgebra/issues/12
</commit_message>
<xml_diff>
--- a/extras/Vignette.pptx
+++ b/extras/Vignette.pptx
@@ -6,6 +6,9 @@
   </p:sldMasterIdLst>
   <p:sldIdLst>
     <p:sldId id="256" r:id="rId2"/>
+    <p:sldId id="257" r:id="rId3"/>
+    <p:sldId id="258" r:id="rId4"/>
+    <p:sldId id="259" r:id="rId5"/>
   </p:sldIdLst>
   <p:sldSz cx="12192000" cy="6858000"/>
   <p:notesSz cx="6858000" cy="9144000"/>
@@ -104,6 +107,11 @@
       </a:defRPr>
     </a:lvl9pPr>
   </p:defaultTextStyle>
+  <p:extLst>
+    <p:ext uri="{EFAFB233-063F-42B5-8137-9DF3F51BA10A}">
+      <p15:sldGuideLst xmlns:p15="http://schemas.microsoft.com/office/powerpoint/2012/main"/>
+    </p:ext>
+  </p:extLst>
 </p:presentation>
 </file>
 
@@ -238,7 +246,7 @@
           <a:p>
             <a:fld id="{D415BA7F-60B0-4A73-95AD-754B31BE1533}" type="datetimeFigureOut">
               <a:rPr lang="en-US" smtClean="0"/>
-              <a:t>7/11/2022</a:t>
+              <a:t>7/12/2022</a:t>
             </a:fld>
             <a:endParaRPr lang="en-US"/>
           </a:p>
@@ -408,7 +416,7 @@
           <a:p>
             <a:fld id="{D415BA7F-60B0-4A73-95AD-754B31BE1533}" type="datetimeFigureOut">
               <a:rPr lang="en-US" smtClean="0"/>
-              <a:t>7/11/2022</a:t>
+              <a:t>7/12/2022</a:t>
             </a:fld>
             <a:endParaRPr lang="en-US"/>
           </a:p>
@@ -588,7 +596,7 @@
           <a:p>
             <a:fld id="{D415BA7F-60B0-4A73-95AD-754B31BE1533}" type="datetimeFigureOut">
               <a:rPr lang="en-US" smtClean="0"/>
-              <a:t>7/11/2022</a:t>
+              <a:t>7/12/2022</a:t>
             </a:fld>
             <a:endParaRPr lang="en-US"/>
           </a:p>
@@ -758,7 +766,7 @@
           <a:p>
             <a:fld id="{D415BA7F-60B0-4A73-95AD-754B31BE1533}" type="datetimeFigureOut">
               <a:rPr lang="en-US" smtClean="0"/>
-              <a:t>7/11/2022</a:t>
+              <a:t>7/12/2022</a:t>
             </a:fld>
             <a:endParaRPr lang="en-US"/>
           </a:p>
@@ -1004,7 +1012,7 @@
           <a:p>
             <a:fld id="{D415BA7F-60B0-4A73-95AD-754B31BE1533}" type="datetimeFigureOut">
               <a:rPr lang="en-US" smtClean="0"/>
-              <a:t>7/11/2022</a:t>
+              <a:t>7/12/2022</a:t>
             </a:fld>
             <a:endParaRPr lang="en-US"/>
           </a:p>
@@ -1236,7 +1244,7 @@
           <a:p>
             <a:fld id="{D415BA7F-60B0-4A73-95AD-754B31BE1533}" type="datetimeFigureOut">
               <a:rPr lang="en-US" smtClean="0"/>
-              <a:t>7/11/2022</a:t>
+              <a:t>7/12/2022</a:t>
             </a:fld>
             <a:endParaRPr lang="en-US"/>
           </a:p>
@@ -1603,7 +1611,7 @@
           <a:p>
             <a:fld id="{D415BA7F-60B0-4A73-95AD-754B31BE1533}" type="datetimeFigureOut">
               <a:rPr lang="en-US" smtClean="0"/>
-              <a:t>7/11/2022</a:t>
+              <a:t>7/12/2022</a:t>
             </a:fld>
             <a:endParaRPr lang="en-US"/>
           </a:p>
@@ -1721,7 +1729,7 @@
           <a:p>
             <a:fld id="{D415BA7F-60B0-4A73-95AD-754B31BE1533}" type="datetimeFigureOut">
               <a:rPr lang="en-US" smtClean="0"/>
-              <a:t>7/11/2022</a:t>
+              <a:t>7/12/2022</a:t>
             </a:fld>
             <a:endParaRPr lang="en-US"/>
           </a:p>
@@ -1816,7 +1824,7 @@
           <a:p>
             <a:fld id="{D415BA7F-60B0-4A73-95AD-754B31BE1533}" type="datetimeFigureOut">
               <a:rPr lang="en-US" smtClean="0"/>
-              <a:t>7/11/2022</a:t>
+              <a:t>7/12/2022</a:t>
             </a:fld>
             <a:endParaRPr lang="en-US"/>
           </a:p>
@@ -2093,7 +2101,7 @@
           <a:p>
             <a:fld id="{D415BA7F-60B0-4A73-95AD-754B31BE1533}" type="datetimeFigureOut">
               <a:rPr lang="en-US" smtClean="0"/>
-              <a:t>7/11/2022</a:t>
+              <a:t>7/12/2022</a:t>
             </a:fld>
             <a:endParaRPr lang="en-US"/>
           </a:p>
@@ -2346,7 +2354,7 @@
           <a:p>
             <a:fld id="{D415BA7F-60B0-4A73-95AD-754B31BE1533}" type="datetimeFigureOut">
               <a:rPr lang="en-US" smtClean="0"/>
-              <a:t>7/11/2022</a:t>
+              <a:t>7/12/2022</a:t>
             </a:fld>
             <a:endParaRPr lang="en-US"/>
           </a:p>
@@ -2559,7 +2567,7 @@
           <a:p>
             <a:fld id="{D415BA7F-60B0-4A73-95AD-754B31BE1533}" type="datetimeFigureOut">
               <a:rPr lang="en-US" smtClean="0"/>
-              <a:t>7/11/2022</a:t>
+              <a:t>7/12/2022</a:t>
             </a:fld>
             <a:endParaRPr lang="en-US"/>
           </a:p>
@@ -3839,6 +3847,2691 @@
 </p:sld>
 </file>
 
+<file path=ppt/slides/slide2.xml><?xml version="1.0" encoding="utf-8"?>
+<p:sld xmlns:a="http://schemas.openxmlformats.org/drawingml/2006/main" xmlns:r="http://schemas.openxmlformats.org/officeDocument/2006/relationships" xmlns:p="http://schemas.openxmlformats.org/presentationml/2006/main">
+  <p:cSld>
+    <p:spTree>
+      <p:nvGrpSpPr>
+        <p:cNvPr id="1" name=""/>
+        <p:cNvGrpSpPr/>
+        <p:nvPr/>
+      </p:nvGrpSpPr>
+      <p:grpSpPr>
+        <a:xfrm>
+          <a:off x="0" y="0"/>
+          <a:ext cx="0" cy="0"/>
+          <a:chOff x="0" y="0"/>
+          <a:chExt cx="0" cy="0"/>
+        </a:xfrm>
+      </p:grpSpPr>
+      <p:sp>
+        <p:nvSpPr>
+          <p:cNvPr id="8" name="Rectangle 7"/>
+          <p:cNvSpPr/>
+          <p:nvPr/>
+        </p:nvSpPr>
+        <p:spPr>
+          <a:xfrm>
+            <a:off x="637082" y="406653"/>
+            <a:ext cx="6941975" cy="3377681"/>
+          </a:xfrm>
+          <a:prstGeom prst="rect">
+            <a:avLst/>
+          </a:prstGeom>
+          <a:noFill/>
+          <a:ln>
+            <a:solidFill>
+              <a:schemeClr val="tx1"/>
+            </a:solidFill>
+          </a:ln>
+        </p:spPr>
+        <p:style>
+          <a:lnRef idx="2">
+            <a:schemeClr val="accent1">
+              <a:shade val="50000"/>
+            </a:schemeClr>
+          </a:lnRef>
+          <a:fillRef idx="1">
+            <a:schemeClr val="accent1"/>
+          </a:fillRef>
+          <a:effectRef idx="0">
+            <a:schemeClr val="accent1"/>
+          </a:effectRef>
+          <a:fontRef idx="minor">
+            <a:schemeClr val="lt1"/>
+          </a:fontRef>
+        </p:style>
+        <p:txBody>
+          <a:bodyPr rtlCol="0" anchor="ctr"/>
+          <a:lstStyle/>
+          <a:p>
+            <a:pPr algn="ctr"/>
+            <a:endParaRPr lang="en-US"/>
+          </a:p>
+        </p:txBody>
+      </p:sp>
+      <p:cxnSp>
+        <p:nvCxnSpPr>
+          <p:cNvPr id="5" name="Straight Arrow Connector 4"/>
+          <p:cNvCxnSpPr/>
+          <p:nvPr/>
+        </p:nvCxnSpPr>
+        <p:spPr>
+          <a:xfrm>
+            <a:off x="2132300" y="1787575"/>
+            <a:ext cx="18615" cy="4782"/>
+          </a:xfrm>
+          <a:prstGeom prst="straightConnector1">
+            <a:avLst/>
+          </a:prstGeom>
+          <a:ln w="28575" cap="sq">
+            <a:solidFill>
+              <a:schemeClr val="tx1">
+                <a:alpha val="93000"/>
+              </a:schemeClr>
+            </a:solidFill>
+            <a:bevel/>
+            <a:headEnd type="diamond" w="lg" len="lg"/>
+            <a:tailEnd type="diamond" w="lg" len="lg"/>
+          </a:ln>
+        </p:spPr>
+        <p:style>
+          <a:lnRef idx="1">
+            <a:schemeClr val="accent1"/>
+          </a:lnRef>
+          <a:fillRef idx="0">
+            <a:schemeClr val="accent1"/>
+          </a:fillRef>
+          <a:effectRef idx="0">
+            <a:schemeClr val="accent1"/>
+          </a:effectRef>
+          <a:fontRef idx="minor">
+            <a:schemeClr val="tx1"/>
+          </a:fontRef>
+        </p:style>
+      </p:cxnSp>
+      <p:sp>
+        <p:nvSpPr>
+          <p:cNvPr id="9" name="TextBox 8"/>
+          <p:cNvSpPr txBox="1"/>
+          <p:nvPr/>
+        </p:nvSpPr>
+        <p:spPr>
+          <a:xfrm>
+            <a:off x="1491665" y="1403524"/>
+            <a:ext cx="1119674" cy="369332"/>
+          </a:xfrm>
+          <a:prstGeom prst="rect">
+            <a:avLst/>
+          </a:prstGeom>
+          <a:noFill/>
+        </p:spPr>
+        <p:txBody>
+          <a:bodyPr wrap="square" rtlCol="0">
+            <a:spAutoFit/>
+          </a:bodyPr>
+          <a:lstStyle/>
+          <a:p>
+            <a:r>
+              <a:rPr lang="en-US" dirty="0" smtClean="0"/>
+              <a:t>Cohort 1</a:t>
+            </a:r>
+            <a:endParaRPr lang="en-US" dirty="0"/>
+          </a:p>
+        </p:txBody>
+      </p:sp>
+      <p:cxnSp>
+        <p:nvCxnSpPr>
+          <p:cNvPr id="10" name="Straight Arrow Connector 9"/>
+          <p:cNvCxnSpPr/>
+          <p:nvPr/>
+        </p:nvCxnSpPr>
+        <p:spPr>
+          <a:xfrm flipV="1">
+            <a:off x="2168319" y="2561007"/>
+            <a:ext cx="2238330" cy="1527"/>
+          </a:xfrm>
+          <a:prstGeom prst="straightConnector1">
+            <a:avLst/>
+          </a:prstGeom>
+          <a:ln w="28575" cap="sq">
+            <a:solidFill>
+              <a:schemeClr val="tx1">
+                <a:alpha val="93000"/>
+              </a:schemeClr>
+            </a:solidFill>
+            <a:bevel/>
+            <a:headEnd type="diamond" w="lg" len="lg"/>
+            <a:tailEnd type="diamond" w="lg" len="lg"/>
+          </a:ln>
+        </p:spPr>
+        <p:style>
+          <a:lnRef idx="1">
+            <a:schemeClr val="accent1"/>
+          </a:lnRef>
+          <a:fillRef idx="0">
+            <a:schemeClr val="accent1"/>
+          </a:fillRef>
+          <a:effectRef idx="0">
+            <a:schemeClr val="accent1"/>
+          </a:effectRef>
+          <a:fontRef idx="minor">
+            <a:schemeClr val="tx1"/>
+          </a:fontRef>
+        </p:style>
+      </p:cxnSp>
+      <p:sp>
+        <p:nvSpPr>
+          <p:cNvPr id="11" name="TextBox 10"/>
+          <p:cNvSpPr txBox="1"/>
+          <p:nvPr/>
+        </p:nvSpPr>
+        <p:spPr>
+          <a:xfrm>
+            <a:off x="2951582" y="2202032"/>
+            <a:ext cx="1119674" cy="369332"/>
+          </a:xfrm>
+          <a:prstGeom prst="rect">
+            <a:avLst/>
+          </a:prstGeom>
+          <a:noFill/>
+        </p:spPr>
+        <p:txBody>
+          <a:bodyPr wrap="square" rtlCol="0">
+            <a:spAutoFit/>
+          </a:bodyPr>
+          <a:lstStyle/>
+          <a:p>
+            <a:r>
+              <a:rPr lang="en-US" dirty="0" smtClean="0"/>
+              <a:t>Cohort 2</a:t>
+            </a:r>
+            <a:endParaRPr lang="en-US" dirty="0"/>
+          </a:p>
+        </p:txBody>
+      </p:sp>
+      <p:sp>
+        <p:nvSpPr>
+          <p:cNvPr id="14" name="TextBox 13"/>
+          <p:cNvSpPr txBox="1"/>
+          <p:nvPr/>
+        </p:nvSpPr>
+        <p:spPr>
+          <a:xfrm>
+            <a:off x="1063690" y="513184"/>
+            <a:ext cx="5122506" cy="369332"/>
+          </a:xfrm>
+          <a:prstGeom prst="rect">
+            <a:avLst/>
+          </a:prstGeom>
+          <a:noFill/>
+        </p:spPr>
+        <p:txBody>
+          <a:bodyPr wrap="square" rtlCol="0">
+            <a:spAutoFit/>
+          </a:bodyPr>
+          <a:lstStyle/>
+          <a:p>
+            <a:r>
+              <a:rPr lang="en-US" dirty="0" smtClean="0"/>
+              <a:t>Cohort </a:t>
+            </a:r>
+            <a:r>
+              <a:rPr lang="en-US" dirty="0" smtClean="0"/>
+              <a:t>Intersect: 1 day cohort with </a:t>
+            </a:r>
+            <a:endParaRPr lang="en-US" dirty="0"/>
+          </a:p>
+        </p:txBody>
+      </p:sp>
+      <p:sp>
+        <p:nvSpPr>
+          <p:cNvPr id="15" name="TextBox 14"/>
+          <p:cNvSpPr txBox="1"/>
+          <p:nvPr/>
+        </p:nvSpPr>
+        <p:spPr>
+          <a:xfrm>
+            <a:off x="709127" y="46652"/>
+            <a:ext cx="1614195" cy="369332"/>
+          </a:xfrm>
+          <a:prstGeom prst="rect">
+            <a:avLst/>
+          </a:prstGeom>
+          <a:noFill/>
+        </p:spPr>
+        <p:txBody>
+          <a:bodyPr wrap="square" rtlCol="0">
+            <a:spAutoFit/>
+          </a:bodyPr>
+          <a:lstStyle/>
+          <a:p>
+            <a:r>
+              <a:rPr lang="en-US" dirty="0" smtClean="0"/>
+              <a:t>Input</a:t>
+            </a:r>
+            <a:endParaRPr lang="en-US" dirty="0"/>
+          </a:p>
+        </p:txBody>
+      </p:sp>
+      <p:sp>
+        <p:nvSpPr>
+          <p:cNvPr id="16" name="TextBox 15"/>
+          <p:cNvSpPr txBox="1"/>
+          <p:nvPr/>
+        </p:nvSpPr>
+        <p:spPr>
+          <a:xfrm>
+            <a:off x="555946" y="3930214"/>
+            <a:ext cx="1614195" cy="369332"/>
+          </a:xfrm>
+          <a:prstGeom prst="rect">
+            <a:avLst/>
+          </a:prstGeom>
+          <a:noFill/>
+        </p:spPr>
+        <p:txBody>
+          <a:bodyPr wrap="square" rtlCol="0">
+            <a:spAutoFit/>
+          </a:bodyPr>
+          <a:lstStyle/>
+          <a:p>
+            <a:r>
+              <a:rPr lang="en-US" dirty="0" smtClean="0"/>
+              <a:t>Output</a:t>
+            </a:r>
+            <a:endParaRPr lang="en-US" dirty="0"/>
+          </a:p>
+        </p:txBody>
+      </p:sp>
+      <p:sp>
+        <p:nvSpPr>
+          <p:cNvPr id="17" name="TextBox 16"/>
+          <p:cNvSpPr txBox="1"/>
+          <p:nvPr/>
+        </p:nvSpPr>
+        <p:spPr>
+          <a:xfrm>
+            <a:off x="1937090" y="1940773"/>
+            <a:ext cx="668695" cy="216133"/>
+          </a:xfrm>
+          <a:prstGeom prst="rect">
+            <a:avLst/>
+          </a:prstGeom>
+          <a:noFill/>
+        </p:spPr>
+        <p:txBody>
+          <a:bodyPr wrap="square" rtlCol="0">
+            <a:spAutoFit/>
+          </a:bodyPr>
+          <a:lstStyle/>
+          <a:p>
+            <a:r>
+              <a:rPr lang="en-US" sz="800" dirty="0" smtClean="0"/>
+              <a:t>Jan/1/2022</a:t>
+            </a:r>
+            <a:endParaRPr lang="en-US" sz="800" dirty="0"/>
+          </a:p>
+        </p:txBody>
+      </p:sp>
+      <p:sp>
+        <p:nvSpPr>
+          <p:cNvPr id="19" name="TextBox 18"/>
+          <p:cNvSpPr txBox="1"/>
+          <p:nvPr/>
+        </p:nvSpPr>
+        <p:spPr>
+          <a:xfrm>
+            <a:off x="2235189" y="2676882"/>
+            <a:ext cx="843911" cy="215444"/>
+          </a:xfrm>
+          <a:prstGeom prst="rect">
+            <a:avLst/>
+          </a:prstGeom>
+          <a:noFill/>
+        </p:spPr>
+        <p:txBody>
+          <a:bodyPr wrap="square" rtlCol="0">
+            <a:spAutoFit/>
+          </a:bodyPr>
+          <a:lstStyle/>
+          <a:p>
+            <a:r>
+              <a:rPr lang="en-US" sz="800" dirty="0" smtClean="0"/>
+              <a:t>Jan/1/2022</a:t>
+            </a:r>
+            <a:endParaRPr lang="en-US" sz="800" dirty="0"/>
+          </a:p>
+        </p:txBody>
+      </p:sp>
+      <p:sp>
+        <p:nvSpPr>
+          <p:cNvPr id="20" name="TextBox 19"/>
+          <p:cNvSpPr txBox="1"/>
+          <p:nvPr/>
+        </p:nvSpPr>
+        <p:spPr>
+          <a:xfrm>
+            <a:off x="4131140" y="2640898"/>
+            <a:ext cx="926050" cy="215444"/>
+          </a:xfrm>
+          <a:prstGeom prst="rect">
+            <a:avLst/>
+          </a:prstGeom>
+          <a:noFill/>
+        </p:spPr>
+        <p:txBody>
+          <a:bodyPr wrap="square" rtlCol="0">
+            <a:spAutoFit/>
+          </a:bodyPr>
+          <a:lstStyle/>
+          <a:p>
+            <a:r>
+              <a:rPr lang="en-US" sz="800" dirty="0" smtClean="0"/>
+              <a:t>Jan</a:t>
+            </a:r>
+            <a:r>
+              <a:rPr lang="en-US" sz="800" dirty="0" smtClean="0"/>
+              <a:t>/2/2022</a:t>
+            </a:r>
+            <a:endParaRPr lang="en-US" sz="800" dirty="0"/>
+          </a:p>
+        </p:txBody>
+      </p:sp>
+      <p:sp>
+        <p:nvSpPr>
+          <p:cNvPr id="23" name="Rectangle 22"/>
+          <p:cNvSpPr/>
+          <p:nvPr/>
+        </p:nvSpPr>
+        <p:spPr>
+          <a:xfrm>
+            <a:off x="637082" y="4328984"/>
+            <a:ext cx="6941975" cy="1547346"/>
+          </a:xfrm>
+          <a:prstGeom prst="rect">
+            <a:avLst/>
+          </a:prstGeom>
+          <a:noFill/>
+          <a:ln>
+            <a:solidFill>
+              <a:schemeClr val="tx1"/>
+            </a:solidFill>
+          </a:ln>
+        </p:spPr>
+        <p:style>
+          <a:lnRef idx="2">
+            <a:schemeClr val="accent1">
+              <a:shade val="50000"/>
+            </a:schemeClr>
+          </a:lnRef>
+          <a:fillRef idx="1">
+            <a:schemeClr val="accent1"/>
+          </a:fillRef>
+          <a:effectRef idx="0">
+            <a:schemeClr val="accent1"/>
+          </a:effectRef>
+          <a:fontRef idx="minor">
+            <a:schemeClr val="lt1"/>
+          </a:fontRef>
+        </p:style>
+        <p:txBody>
+          <a:bodyPr rtlCol="0" anchor="ctr"/>
+          <a:lstStyle/>
+          <a:p>
+            <a:pPr algn="ctr"/>
+            <a:endParaRPr lang="en-US"/>
+          </a:p>
+        </p:txBody>
+      </p:sp>
+      <p:cxnSp>
+        <p:nvCxnSpPr>
+          <p:cNvPr id="24" name="Straight Arrow Connector 23"/>
+          <p:cNvCxnSpPr/>
+          <p:nvPr/>
+        </p:nvCxnSpPr>
+        <p:spPr>
+          <a:xfrm flipV="1">
+            <a:off x="2146720" y="5279601"/>
+            <a:ext cx="22903" cy="22241"/>
+          </a:xfrm>
+          <a:prstGeom prst="straightConnector1">
+            <a:avLst/>
+          </a:prstGeom>
+          <a:ln w="28575" cap="sq">
+            <a:solidFill>
+              <a:schemeClr val="tx1">
+                <a:alpha val="93000"/>
+              </a:schemeClr>
+            </a:solidFill>
+            <a:bevel/>
+            <a:headEnd type="diamond" w="lg" len="lg"/>
+            <a:tailEnd type="diamond" w="lg" len="lg"/>
+          </a:ln>
+        </p:spPr>
+        <p:style>
+          <a:lnRef idx="1">
+            <a:schemeClr val="accent1"/>
+          </a:lnRef>
+          <a:fillRef idx="0">
+            <a:schemeClr val="accent1"/>
+          </a:fillRef>
+          <a:effectRef idx="0">
+            <a:schemeClr val="accent1"/>
+          </a:effectRef>
+          <a:fontRef idx="minor">
+            <a:schemeClr val="tx1"/>
+          </a:fontRef>
+        </p:style>
+      </p:cxnSp>
+      <p:sp>
+        <p:nvSpPr>
+          <p:cNvPr id="25" name="TextBox 24"/>
+          <p:cNvSpPr txBox="1"/>
+          <p:nvPr/>
+        </p:nvSpPr>
+        <p:spPr>
+          <a:xfrm>
+            <a:off x="1608482" y="4880831"/>
+            <a:ext cx="1119674" cy="369332"/>
+          </a:xfrm>
+          <a:prstGeom prst="rect">
+            <a:avLst/>
+          </a:prstGeom>
+          <a:noFill/>
+        </p:spPr>
+        <p:txBody>
+          <a:bodyPr wrap="square" rtlCol="0">
+            <a:spAutoFit/>
+          </a:bodyPr>
+          <a:lstStyle/>
+          <a:p>
+            <a:r>
+              <a:rPr lang="en-US" dirty="0" smtClean="0"/>
+              <a:t>Cohort </a:t>
+            </a:r>
+            <a:r>
+              <a:rPr lang="en-US" dirty="0" smtClean="0"/>
+              <a:t>3</a:t>
+            </a:r>
+            <a:endParaRPr lang="en-US" dirty="0"/>
+          </a:p>
+        </p:txBody>
+      </p:sp>
+      <p:sp>
+        <p:nvSpPr>
+          <p:cNvPr id="30" name="TextBox 29"/>
+          <p:cNvSpPr txBox="1"/>
+          <p:nvPr/>
+        </p:nvSpPr>
+        <p:spPr>
+          <a:xfrm>
+            <a:off x="1669276" y="4387860"/>
+            <a:ext cx="5122506" cy="369332"/>
+          </a:xfrm>
+          <a:prstGeom prst="rect">
+            <a:avLst/>
+          </a:prstGeom>
+          <a:noFill/>
+        </p:spPr>
+        <p:txBody>
+          <a:bodyPr wrap="square" rtlCol="0">
+            <a:spAutoFit/>
+          </a:bodyPr>
+          <a:lstStyle/>
+          <a:p>
+            <a:r>
+              <a:rPr lang="en-US" dirty="0" smtClean="0"/>
+              <a:t>Output</a:t>
+            </a:r>
+            <a:endParaRPr lang="en-US" dirty="0"/>
+          </a:p>
+        </p:txBody>
+      </p:sp>
+      <p:sp>
+        <p:nvSpPr>
+          <p:cNvPr id="32" name="TextBox 31"/>
+          <p:cNvSpPr txBox="1"/>
+          <p:nvPr/>
+        </p:nvSpPr>
+        <p:spPr>
+          <a:xfrm>
+            <a:off x="1908008" y="5450257"/>
+            <a:ext cx="668695" cy="216133"/>
+          </a:xfrm>
+          <a:prstGeom prst="rect">
+            <a:avLst/>
+          </a:prstGeom>
+          <a:noFill/>
+        </p:spPr>
+        <p:txBody>
+          <a:bodyPr wrap="square" rtlCol="0">
+            <a:spAutoFit/>
+          </a:bodyPr>
+          <a:lstStyle/>
+          <a:p>
+            <a:r>
+              <a:rPr lang="en-US" sz="800" dirty="0" smtClean="0"/>
+              <a:t>Jan/1/2022</a:t>
+            </a:r>
+            <a:endParaRPr lang="en-US" sz="800" dirty="0"/>
+          </a:p>
+        </p:txBody>
+      </p:sp>
+      <p:sp>
+        <p:nvSpPr>
+          <p:cNvPr id="2" name="TextBox 1"/>
+          <p:cNvSpPr txBox="1"/>
+          <p:nvPr/>
+        </p:nvSpPr>
+        <p:spPr>
+          <a:xfrm>
+            <a:off x="8520545" y="406653"/>
+            <a:ext cx="3366655" cy="369332"/>
+          </a:xfrm>
+          <a:prstGeom prst="rect">
+            <a:avLst/>
+          </a:prstGeom>
+          <a:noFill/>
+        </p:spPr>
+        <p:txBody>
+          <a:bodyPr wrap="square" rtlCol="0">
+            <a:spAutoFit/>
+          </a:bodyPr>
+          <a:lstStyle/>
+          <a:p>
+            <a:r>
+              <a:rPr lang="en-US" dirty="0" smtClean="0"/>
+              <a:t>Intersection one day</a:t>
+            </a:r>
+            <a:endParaRPr lang="en-US" dirty="0"/>
+          </a:p>
+        </p:txBody>
+      </p:sp>
+      <p:sp>
+        <p:nvSpPr>
+          <p:cNvPr id="6" name="TextBox 5"/>
+          <p:cNvSpPr txBox="1"/>
+          <p:nvPr/>
+        </p:nvSpPr>
+        <p:spPr>
+          <a:xfrm>
+            <a:off x="2132300" y="1695796"/>
+            <a:ext cx="45719" cy="399697"/>
+          </a:xfrm>
+          <a:prstGeom prst="rect">
+            <a:avLst/>
+          </a:prstGeom>
+          <a:noFill/>
+        </p:spPr>
+        <p:txBody>
+          <a:bodyPr wrap="square" rtlCol="0">
+            <a:spAutoFit/>
+          </a:bodyPr>
+          <a:lstStyle/>
+          <a:p>
+            <a:endParaRPr lang="en-US" dirty="0"/>
+          </a:p>
+        </p:txBody>
+      </p:sp>
+      <p:sp>
+        <p:nvSpPr>
+          <p:cNvPr id="26" name="TextBox 25"/>
+          <p:cNvSpPr txBox="1"/>
+          <p:nvPr/>
+        </p:nvSpPr>
+        <p:spPr>
+          <a:xfrm>
+            <a:off x="2051502" y="1695466"/>
+            <a:ext cx="190853" cy="1680852"/>
+          </a:xfrm>
+          <a:prstGeom prst="rect">
+            <a:avLst/>
+          </a:prstGeom>
+          <a:noFill/>
+        </p:spPr>
+        <p:txBody>
+          <a:bodyPr wrap="square" rtlCol="0">
+            <a:spAutoFit/>
+          </a:bodyPr>
+          <a:lstStyle/>
+          <a:p>
+            <a:endParaRPr lang="en-US" dirty="0"/>
+          </a:p>
+        </p:txBody>
+      </p:sp>
+    </p:spTree>
+    <p:extLst>
+      <p:ext uri="{BB962C8B-B14F-4D97-AF65-F5344CB8AC3E}">
+        <p14:creationId xmlns:p14="http://schemas.microsoft.com/office/powerpoint/2010/main" val="525306742"/>
+      </p:ext>
+    </p:extLst>
+  </p:cSld>
+  <p:clrMapOvr>
+    <a:masterClrMapping/>
+  </p:clrMapOvr>
+</p:sld>
+</file>
+
+<file path=ppt/slides/slide3.xml><?xml version="1.0" encoding="utf-8"?>
+<p:sld xmlns:a="http://schemas.openxmlformats.org/drawingml/2006/main" xmlns:r="http://schemas.openxmlformats.org/officeDocument/2006/relationships" xmlns:p="http://schemas.openxmlformats.org/presentationml/2006/main">
+  <p:cSld>
+    <p:spTree>
+      <p:nvGrpSpPr>
+        <p:cNvPr id="1" name=""/>
+        <p:cNvGrpSpPr/>
+        <p:nvPr/>
+      </p:nvGrpSpPr>
+      <p:grpSpPr>
+        <a:xfrm>
+          <a:off x="0" y="0"/>
+          <a:ext cx="0" cy="0"/>
+          <a:chOff x="0" y="0"/>
+          <a:chExt cx="0" cy="0"/>
+        </a:xfrm>
+      </p:grpSpPr>
+      <p:sp>
+        <p:nvSpPr>
+          <p:cNvPr id="8" name="Rectangle 7"/>
+          <p:cNvSpPr/>
+          <p:nvPr/>
+        </p:nvSpPr>
+        <p:spPr>
+          <a:xfrm>
+            <a:off x="637082" y="406653"/>
+            <a:ext cx="6941975" cy="3377681"/>
+          </a:xfrm>
+          <a:prstGeom prst="rect">
+            <a:avLst/>
+          </a:prstGeom>
+          <a:noFill/>
+          <a:ln>
+            <a:solidFill>
+              <a:schemeClr val="tx1"/>
+            </a:solidFill>
+          </a:ln>
+        </p:spPr>
+        <p:style>
+          <a:lnRef idx="2">
+            <a:schemeClr val="accent1">
+              <a:shade val="50000"/>
+            </a:schemeClr>
+          </a:lnRef>
+          <a:fillRef idx="1">
+            <a:schemeClr val="accent1"/>
+          </a:fillRef>
+          <a:effectRef idx="0">
+            <a:schemeClr val="accent1"/>
+          </a:effectRef>
+          <a:fontRef idx="minor">
+            <a:schemeClr val="lt1"/>
+          </a:fontRef>
+        </p:style>
+        <p:txBody>
+          <a:bodyPr rtlCol="0" anchor="ctr"/>
+          <a:lstStyle/>
+          <a:p>
+            <a:pPr algn="ctr"/>
+            <a:endParaRPr lang="en-US"/>
+          </a:p>
+        </p:txBody>
+      </p:sp>
+      <p:cxnSp>
+        <p:nvCxnSpPr>
+          <p:cNvPr id="5" name="Straight Arrow Connector 4"/>
+          <p:cNvCxnSpPr/>
+          <p:nvPr/>
+        </p:nvCxnSpPr>
+        <p:spPr>
+          <a:xfrm>
+            <a:off x="1010081" y="1787575"/>
+            <a:ext cx="1928552" cy="8313"/>
+          </a:xfrm>
+          <a:prstGeom prst="straightConnector1">
+            <a:avLst/>
+          </a:prstGeom>
+          <a:ln w="28575" cap="sq">
+            <a:solidFill>
+              <a:schemeClr val="tx1">
+                <a:alpha val="93000"/>
+              </a:schemeClr>
+            </a:solidFill>
+            <a:bevel/>
+            <a:headEnd type="diamond" w="lg" len="lg"/>
+            <a:tailEnd type="diamond" w="lg" len="lg"/>
+          </a:ln>
+        </p:spPr>
+        <p:style>
+          <a:lnRef idx="1">
+            <a:schemeClr val="accent1"/>
+          </a:lnRef>
+          <a:fillRef idx="0">
+            <a:schemeClr val="accent1"/>
+          </a:fillRef>
+          <a:effectRef idx="0">
+            <a:schemeClr val="accent1"/>
+          </a:effectRef>
+          <a:fontRef idx="minor">
+            <a:schemeClr val="tx1"/>
+          </a:fontRef>
+        </p:style>
+      </p:cxnSp>
+      <p:sp>
+        <p:nvSpPr>
+          <p:cNvPr id="9" name="TextBox 8"/>
+          <p:cNvSpPr txBox="1"/>
+          <p:nvPr/>
+        </p:nvSpPr>
+        <p:spPr>
+          <a:xfrm>
+            <a:off x="1483566" y="1436913"/>
+            <a:ext cx="1119674" cy="369332"/>
+          </a:xfrm>
+          <a:prstGeom prst="rect">
+            <a:avLst/>
+          </a:prstGeom>
+          <a:noFill/>
+        </p:spPr>
+        <p:txBody>
+          <a:bodyPr wrap="square" rtlCol="0">
+            <a:spAutoFit/>
+          </a:bodyPr>
+          <a:lstStyle/>
+          <a:p>
+            <a:r>
+              <a:rPr lang="en-US" dirty="0" smtClean="0"/>
+              <a:t>Cohort 1</a:t>
+            </a:r>
+            <a:endParaRPr lang="en-US" dirty="0"/>
+          </a:p>
+        </p:txBody>
+      </p:sp>
+      <p:cxnSp>
+        <p:nvCxnSpPr>
+          <p:cNvPr id="10" name="Straight Arrow Connector 9"/>
+          <p:cNvCxnSpPr/>
+          <p:nvPr/>
+        </p:nvCxnSpPr>
+        <p:spPr>
+          <a:xfrm>
+            <a:off x="2478097" y="2552694"/>
+            <a:ext cx="1928552" cy="8313"/>
+          </a:xfrm>
+          <a:prstGeom prst="straightConnector1">
+            <a:avLst/>
+          </a:prstGeom>
+          <a:ln w="28575" cap="sq">
+            <a:solidFill>
+              <a:schemeClr val="tx1">
+                <a:alpha val="93000"/>
+              </a:schemeClr>
+            </a:solidFill>
+            <a:bevel/>
+            <a:headEnd type="diamond" w="lg" len="lg"/>
+            <a:tailEnd type="diamond" w="lg" len="lg"/>
+          </a:ln>
+        </p:spPr>
+        <p:style>
+          <a:lnRef idx="1">
+            <a:schemeClr val="accent1"/>
+          </a:lnRef>
+          <a:fillRef idx="0">
+            <a:schemeClr val="accent1"/>
+          </a:fillRef>
+          <a:effectRef idx="0">
+            <a:schemeClr val="accent1"/>
+          </a:effectRef>
+          <a:fontRef idx="minor">
+            <a:schemeClr val="tx1"/>
+          </a:fontRef>
+        </p:style>
+      </p:cxnSp>
+      <p:sp>
+        <p:nvSpPr>
+          <p:cNvPr id="11" name="TextBox 10"/>
+          <p:cNvSpPr txBox="1"/>
+          <p:nvPr/>
+        </p:nvSpPr>
+        <p:spPr>
+          <a:xfrm>
+            <a:off x="2951582" y="2202032"/>
+            <a:ext cx="1119674" cy="369332"/>
+          </a:xfrm>
+          <a:prstGeom prst="rect">
+            <a:avLst/>
+          </a:prstGeom>
+          <a:noFill/>
+        </p:spPr>
+        <p:txBody>
+          <a:bodyPr wrap="square" rtlCol="0">
+            <a:spAutoFit/>
+          </a:bodyPr>
+          <a:lstStyle/>
+          <a:p>
+            <a:r>
+              <a:rPr lang="en-US" dirty="0" smtClean="0"/>
+              <a:t>Cohort 2</a:t>
+            </a:r>
+            <a:endParaRPr lang="en-US" dirty="0"/>
+          </a:p>
+        </p:txBody>
+      </p:sp>
+      <p:cxnSp>
+        <p:nvCxnSpPr>
+          <p:cNvPr id="12" name="Straight Arrow Connector 11"/>
+          <p:cNvCxnSpPr/>
+          <p:nvPr/>
+        </p:nvCxnSpPr>
+        <p:spPr>
+          <a:xfrm>
+            <a:off x="1406893" y="3280482"/>
+            <a:ext cx="1928552" cy="8313"/>
+          </a:xfrm>
+          <a:prstGeom prst="straightConnector1">
+            <a:avLst/>
+          </a:prstGeom>
+          <a:ln w="28575" cap="sq">
+            <a:solidFill>
+              <a:schemeClr val="tx1">
+                <a:alpha val="93000"/>
+              </a:schemeClr>
+            </a:solidFill>
+            <a:bevel/>
+            <a:headEnd type="diamond" w="lg" len="lg"/>
+            <a:tailEnd type="diamond" w="lg" len="lg"/>
+          </a:ln>
+        </p:spPr>
+        <p:style>
+          <a:lnRef idx="1">
+            <a:schemeClr val="accent1"/>
+          </a:lnRef>
+          <a:fillRef idx="0">
+            <a:schemeClr val="accent1"/>
+          </a:fillRef>
+          <a:effectRef idx="0">
+            <a:schemeClr val="accent1"/>
+          </a:effectRef>
+          <a:fontRef idx="minor">
+            <a:schemeClr val="tx1"/>
+          </a:fontRef>
+        </p:style>
+      </p:cxnSp>
+      <p:sp>
+        <p:nvSpPr>
+          <p:cNvPr id="13" name="TextBox 12"/>
+          <p:cNvSpPr txBox="1"/>
+          <p:nvPr/>
+        </p:nvSpPr>
+        <p:spPr>
+          <a:xfrm>
+            <a:off x="1160791" y="2890966"/>
+            <a:ext cx="1119674" cy="369332"/>
+          </a:xfrm>
+          <a:prstGeom prst="rect">
+            <a:avLst/>
+          </a:prstGeom>
+          <a:noFill/>
+        </p:spPr>
+        <p:txBody>
+          <a:bodyPr wrap="square" rtlCol="0">
+            <a:spAutoFit/>
+          </a:bodyPr>
+          <a:lstStyle/>
+          <a:p>
+            <a:r>
+              <a:rPr lang="en-US" dirty="0" smtClean="0"/>
+              <a:t>Cohort 3</a:t>
+            </a:r>
+            <a:endParaRPr lang="en-US" dirty="0"/>
+          </a:p>
+        </p:txBody>
+      </p:sp>
+      <p:sp>
+        <p:nvSpPr>
+          <p:cNvPr id="15" name="TextBox 14"/>
+          <p:cNvSpPr txBox="1"/>
+          <p:nvPr/>
+        </p:nvSpPr>
+        <p:spPr>
+          <a:xfrm>
+            <a:off x="709127" y="46652"/>
+            <a:ext cx="1614195" cy="369332"/>
+          </a:xfrm>
+          <a:prstGeom prst="rect">
+            <a:avLst/>
+          </a:prstGeom>
+          <a:noFill/>
+        </p:spPr>
+        <p:txBody>
+          <a:bodyPr wrap="square" rtlCol="0">
+            <a:spAutoFit/>
+          </a:bodyPr>
+          <a:lstStyle/>
+          <a:p>
+            <a:r>
+              <a:rPr lang="en-US" dirty="0" smtClean="0"/>
+              <a:t>Input</a:t>
+            </a:r>
+            <a:endParaRPr lang="en-US" dirty="0"/>
+          </a:p>
+        </p:txBody>
+      </p:sp>
+      <p:sp>
+        <p:nvSpPr>
+          <p:cNvPr id="16" name="TextBox 15"/>
+          <p:cNvSpPr txBox="1"/>
+          <p:nvPr/>
+        </p:nvSpPr>
+        <p:spPr>
+          <a:xfrm>
+            <a:off x="555946" y="3930214"/>
+            <a:ext cx="1614195" cy="369332"/>
+          </a:xfrm>
+          <a:prstGeom prst="rect">
+            <a:avLst/>
+          </a:prstGeom>
+          <a:noFill/>
+        </p:spPr>
+        <p:txBody>
+          <a:bodyPr wrap="square" rtlCol="0">
+            <a:spAutoFit/>
+          </a:bodyPr>
+          <a:lstStyle/>
+          <a:p>
+            <a:r>
+              <a:rPr lang="en-US" dirty="0" smtClean="0"/>
+              <a:t>Output</a:t>
+            </a:r>
+            <a:endParaRPr lang="en-US" dirty="0"/>
+          </a:p>
+        </p:txBody>
+      </p:sp>
+      <p:sp>
+        <p:nvSpPr>
+          <p:cNvPr id="17" name="TextBox 16"/>
+          <p:cNvSpPr txBox="1"/>
+          <p:nvPr/>
+        </p:nvSpPr>
+        <p:spPr>
+          <a:xfrm>
+            <a:off x="814871" y="1940773"/>
+            <a:ext cx="668695" cy="216133"/>
+          </a:xfrm>
+          <a:prstGeom prst="rect">
+            <a:avLst/>
+          </a:prstGeom>
+          <a:noFill/>
+        </p:spPr>
+        <p:txBody>
+          <a:bodyPr wrap="square" rtlCol="0">
+            <a:spAutoFit/>
+          </a:bodyPr>
+          <a:lstStyle/>
+          <a:p>
+            <a:r>
+              <a:rPr lang="en-US" sz="800" dirty="0" smtClean="0"/>
+              <a:t>Jan/1/2022</a:t>
+            </a:r>
+            <a:endParaRPr lang="en-US" sz="800" dirty="0"/>
+          </a:p>
+        </p:txBody>
+      </p:sp>
+      <p:sp>
+        <p:nvSpPr>
+          <p:cNvPr id="18" name="TextBox 17"/>
+          <p:cNvSpPr txBox="1"/>
+          <p:nvPr/>
+        </p:nvSpPr>
+        <p:spPr>
+          <a:xfrm>
+            <a:off x="2816284" y="1946425"/>
+            <a:ext cx="887967" cy="215444"/>
+          </a:xfrm>
+          <a:prstGeom prst="rect">
+            <a:avLst/>
+          </a:prstGeom>
+          <a:noFill/>
+        </p:spPr>
+        <p:txBody>
+          <a:bodyPr wrap="square" rtlCol="0">
+            <a:spAutoFit/>
+          </a:bodyPr>
+          <a:lstStyle/>
+          <a:p>
+            <a:r>
+              <a:rPr lang="en-US" sz="800" dirty="0" smtClean="0"/>
+              <a:t>Mar/1/2022</a:t>
+            </a:r>
+            <a:endParaRPr lang="en-US" sz="800" dirty="0"/>
+          </a:p>
+        </p:txBody>
+      </p:sp>
+      <p:sp>
+        <p:nvSpPr>
+          <p:cNvPr id="19" name="TextBox 18"/>
+          <p:cNvSpPr txBox="1"/>
+          <p:nvPr/>
+        </p:nvSpPr>
+        <p:spPr>
+          <a:xfrm>
+            <a:off x="2235189" y="2676882"/>
+            <a:ext cx="843911" cy="215444"/>
+          </a:xfrm>
+          <a:prstGeom prst="rect">
+            <a:avLst/>
+          </a:prstGeom>
+          <a:noFill/>
+        </p:spPr>
+        <p:txBody>
+          <a:bodyPr wrap="square" rtlCol="0">
+            <a:spAutoFit/>
+          </a:bodyPr>
+          <a:lstStyle/>
+          <a:p>
+            <a:r>
+              <a:rPr lang="en-US" sz="800" dirty="0" smtClean="0"/>
+              <a:t>Feb/10/2022</a:t>
+            </a:r>
+            <a:endParaRPr lang="en-US" sz="800" dirty="0"/>
+          </a:p>
+        </p:txBody>
+      </p:sp>
+      <p:sp>
+        <p:nvSpPr>
+          <p:cNvPr id="20" name="TextBox 19"/>
+          <p:cNvSpPr txBox="1"/>
+          <p:nvPr/>
+        </p:nvSpPr>
+        <p:spPr>
+          <a:xfrm>
+            <a:off x="4131140" y="2640898"/>
+            <a:ext cx="926050" cy="215444"/>
+          </a:xfrm>
+          <a:prstGeom prst="rect">
+            <a:avLst/>
+          </a:prstGeom>
+          <a:noFill/>
+        </p:spPr>
+        <p:txBody>
+          <a:bodyPr wrap="square" rtlCol="0">
+            <a:spAutoFit/>
+          </a:bodyPr>
+          <a:lstStyle/>
+          <a:p>
+            <a:r>
+              <a:rPr lang="en-US" sz="800" dirty="0" smtClean="0"/>
+              <a:t>May/10/2022</a:t>
+            </a:r>
+            <a:endParaRPr lang="en-US" sz="800" dirty="0"/>
+          </a:p>
+        </p:txBody>
+      </p:sp>
+      <p:sp>
+        <p:nvSpPr>
+          <p:cNvPr id="21" name="TextBox 20"/>
+          <p:cNvSpPr txBox="1"/>
+          <p:nvPr/>
+        </p:nvSpPr>
+        <p:spPr>
+          <a:xfrm>
+            <a:off x="2280465" y="3318463"/>
+            <a:ext cx="926050" cy="215444"/>
+          </a:xfrm>
+          <a:prstGeom prst="rect">
+            <a:avLst/>
+          </a:prstGeom>
+          <a:noFill/>
+        </p:spPr>
+        <p:txBody>
+          <a:bodyPr wrap="square" rtlCol="0">
+            <a:spAutoFit/>
+          </a:bodyPr>
+          <a:lstStyle/>
+          <a:p>
+            <a:r>
+              <a:rPr lang="en-US" sz="800" dirty="0" smtClean="0"/>
+              <a:t>Mar/15/2022</a:t>
+            </a:r>
+            <a:endParaRPr lang="en-US" sz="800" dirty="0"/>
+          </a:p>
+        </p:txBody>
+      </p:sp>
+      <p:sp>
+        <p:nvSpPr>
+          <p:cNvPr id="22" name="TextBox 21"/>
+          <p:cNvSpPr txBox="1"/>
+          <p:nvPr/>
+        </p:nvSpPr>
+        <p:spPr>
+          <a:xfrm>
+            <a:off x="950850" y="3330050"/>
+            <a:ext cx="843911" cy="215444"/>
+          </a:xfrm>
+          <a:prstGeom prst="rect">
+            <a:avLst/>
+          </a:prstGeom>
+          <a:noFill/>
+        </p:spPr>
+        <p:txBody>
+          <a:bodyPr wrap="square" rtlCol="0">
+            <a:spAutoFit/>
+          </a:bodyPr>
+          <a:lstStyle/>
+          <a:p>
+            <a:r>
+              <a:rPr lang="en-US" sz="800" dirty="0" smtClean="0"/>
+              <a:t>Jan</a:t>
+            </a:r>
+            <a:r>
+              <a:rPr lang="en-US" sz="800" dirty="0" smtClean="0"/>
+              <a:t>/15/2022</a:t>
+            </a:r>
+            <a:endParaRPr lang="en-US" sz="800" dirty="0"/>
+          </a:p>
+        </p:txBody>
+      </p:sp>
+      <p:sp>
+        <p:nvSpPr>
+          <p:cNvPr id="23" name="Rectangle 22"/>
+          <p:cNvSpPr/>
+          <p:nvPr/>
+        </p:nvSpPr>
+        <p:spPr>
+          <a:xfrm>
+            <a:off x="637082" y="4328984"/>
+            <a:ext cx="6941975" cy="1547346"/>
+          </a:xfrm>
+          <a:prstGeom prst="rect">
+            <a:avLst/>
+          </a:prstGeom>
+          <a:noFill/>
+          <a:ln>
+            <a:solidFill>
+              <a:schemeClr val="tx1"/>
+            </a:solidFill>
+          </a:ln>
+        </p:spPr>
+        <p:style>
+          <a:lnRef idx="2">
+            <a:schemeClr val="accent1">
+              <a:shade val="50000"/>
+            </a:schemeClr>
+          </a:lnRef>
+          <a:fillRef idx="1">
+            <a:schemeClr val="accent1"/>
+          </a:fillRef>
+          <a:effectRef idx="0">
+            <a:schemeClr val="accent1"/>
+          </a:effectRef>
+          <a:fontRef idx="minor">
+            <a:schemeClr val="lt1"/>
+          </a:fontRef>
+        </p:style>
+        <p:txBody>
+          <a:bodyPr rtlCol="0" anchor="ctr"/>
+          <a:lstStyle/>
+          <a:p>
+            <a:pPr algn="ctr"/>
+            <a:endParaRPr lang="en-US"/>
+          </a:p>
+        </p:txBody>
+      </p:sp>
+      <p:cxnSp>
+        <p:nvCxnSpPr>
+          <p:cNvPr id="24" name="Straight Arrow Connector 23"/>
+          <p:cNvCxnSpPr/>
+          <p:nvPr/>
+        </p:nvCxnSpPr>
+        <p:spPr>
+          <a:xfrm>
+            <a:off x="2478097" y="5250163"/>
+            <a:ext cx="601003" cy="0"/>
+          </a:xfrm>
+          <a:prstGeom prst="straightConnector1">
+            <a:avLst/>
+          </a:prstGeom>
+          <a:ln w="28575" cap="sq">
+            <a:solidFill>
+              <a:schemeClr val="tx1">
+                <a:alpha val="93000"/>
+              </a:schemeClr>
+            </a:solidFill>
+            <a:bevel/>
+            <a:headEnd type="diamond" w="lg" len="lg"/>
+            <a:tailEnd type="diamond" w="lg" len="lg"/>
+          </a:ln>
+        </p:spPr>
+        <p:style>
+          <a:lnRef idx="1">
+            <a:schemeClr val="accent1"/>
+          </a:lnRef>
+          <a:fillRef idx="0">
+            <a:schemeClr val="accent1"/>
+          </a:fillRef>
+          <a:effectRef idx="0">
+            <a:schemeClr val="accent1"/>
+          </a:effectRef>
+          <a:fontRef idx="minor">
+            <a:schemeClr val="tx1"/>
+          </a:fontRef>
+        </p:style>
+      </p:cxnSp>
+      <p:sp>
+        <p:nvSpPr>
+          <p:cNvPr id="25" name="TextBox 24"/>
+          <p:cNvSpPr txBox="1"/>
+          <p:nvPr/>
+        </p:nvSpPr>
+        <p:spPr>
+          <a:xfrm>
+            <a:off x="2988395" y="4880831"/>
+            <a:ext cx="1119674" cy="369332"/>
+          </a:xfrm>
+          <a:prstGeom prst="rect">
+            <a:avLst/>
+          </a:prstGeom>
+          <a:noFill/>
+        </p:spPr>
+        <p:txBody>
+          <a:bodyPr wrap="square" rtlCol="0">
+            <a:spAutoFit/>
+          </a:bodyPr>
+          <a:lstStyle/>
+          <a:p>
+            <a:r>
+              <a:rPr lang="en-US" dirty="0" smtClean="0"/>
+              <a:t>Cohort 4</a:t>
+            </a:r>
+            <a:endParaRPr lang="en-US" dirty="0"/>
+          </a:p>
+        </p:txBody>
+      </p:sp>
+      <p:sp>
+        <p:nvSpPr>
+          <p:cNvPr id="30" name="TextBox 29"/>
+          <p:cNvSpPr txBox="1"/>
+          <p:nvPr/>
+        </p:nvSpPr>
+        <p:spPr>
+          <a:xfrm>
+            <a:off x="1669276" y="4387860"/>
+            <a:ext cx="5122506" cy="369332"/>
+          </a:xfrm>
+          <a:prstGeom prst="rect">
+            <a:avLst/>
+          </a:prstGeom>
+          <a:noFill/>
+        </p:spPr>
+        <p:txBody>
+          <a:bodyPr wrap="square" rtlCol="0">
+            <a:spAutoFit/>
+          </a:bodyPr>
+          <a:lstStyle/>
+          <a:p>
+            <a:r>
+              <a:rPr lang="en-US" dirty="0" smtClean="0"/>
+              <a:t>Output</a:t>
+            </a:r>
+            <a:endParaRPr lang="en-US" dirty="0"/>
+          </a:p>
+        </p:txBody>
+      </p:sp>
+      <p:sp>
+        <p:nvSpPr>
+          <p:cNvPr id="32" name="TextBox 31"/>
+          <p:cNvSpPr txBox="1"/>
+          <p:nvPr/>
+        </p:nvSpPr>
+        <p:spPr>
+          <a:xfrm>
+            <a:off x="1955110" y="5482485"/>
+            <a:ext cx="809077" cy="215444"/>
+          </a:xfrm>
+          <a:prstGeom prst="rect">
+            <a:avLst/>
+          </a:prstGeom>
+          <a:noFill/>
+        </p:spPr>
+        <p:txBody>
+          <a:bodyPr wrap="square" rtlCol="0">
+            <a:spAutoFit/>
+          </a:bodyPr>
+          <a:lstStyle/>
+          <a:p>
+            <a:r>
+              <a:rPr lang="en-US" sz="800" dirty="0" smtClean="0"/>
+              <a:t>Feb</a:t>
+            </a:r>
+            <a:r>
+              <a:rPr lang="en-US" sz="800" dirty="0" smtClean="0"/>
+              <a:t>/10/2022</a:t>
+            </a:r>
+            <a:endParaRPr lang="en-US" sz="800" dirty="0"/>
+          </a:p>
+        </p:txBody>
+      </p:sp>
+      <p:sp>
+        <p:nvSpPr>
+          <p:cNvPr id="45" name="TextBox 44"/>
+          <p:cNvSpPr txBox="1"/>
+          <p:nvPr/>
+        </p:nvSpPr>
+        <p:spPr>
+          <a:xfrm>
+            <a:off x="2743490" y="5482485"/>
+            <a:ext cx="926050" cy="215444"/>
+          </a:xfrm>
+          <a:prstGeom prst="rect">
+            <a:avLst/>
+          </a:prstGeom>
+          <a:noFill/>
+        </p:spPr>
+        <p:txBody>
+          <a:bodyPr wrap="square" rtlCol="0">
+            <a:spAutoFit/>
+          </a:bodyPr>
+          <a:lstStyle/>
+          <a:p>
+            <a:r>
+              <a:rPr lang="en-US" sz="800" dirty="0" smtClean="0"/>
+              <a:t>Mar/1/2022</a:t>
+            </a:r>
+            <a:endParaRPr lang="en-US" sz="800" dirty="0"/>
+          </a:p>
+        </p:txBody>
+      </p:sp>
+      <p:sp>
+        <p:nvSpPr>
+          <p:cNvPr id="28" name="TextBox 27"/>
+          <p:cNvSpPr txBox="1"/>
+          <p:nvPr/>
+        </p:nvSpPr>
+        <p:spPr>
+          <a:xfrm>
+            <a:off x="1063690" y="513184"/>
+            <a:ext cx="5122506" cy="369332"/>
+          </a:xfrm>
+          <a:prstGeom prst="rect">
+            <a:avLst/>
+          </a:prstGeom>
+          <a:noFill/>
+        </p:spPr>
+        <p:txBody>
+          <a:bodyPr wrap="square" rtlCol="0">
+            <a:spAutoFit/>
+          </a:bodyPr>
+          <a:lstStyle/>
+          <a:p>
+            <a:r>
+              <a:rPr lang="en-US" dirty="0" smtClean="0"/>
+              <a:t>Cohort </a:t>
+            </a:r>
+            <a:r>
+              <a:rPr lang="en-US" dirty="0" smtClean="0"/>
+              <a:t>Intersect:</a:t>
+            </a:r>
+            <a:endParaRPr lang="en-US" dirty="0"/>
+          </a:p>
+        </p:txBody>
+      </p:sp>
+      <p:sp>
+        <p:nvSpPr>
+          <p:cNvPr id="4" name="Rectangle 3"/>
+          <p:cNvSpPr/>
+          <p:nvPr/>
+        </p:nvSpPr>
+        <p:spPr>
+          <a:xfrm>
+            <a:off x="1010081" y="1354975"/>
+            <a:ext cx="396812" cy="2429359"/>
+          </a:xfrm>
+          <a:prstGeom prst="rect">
+            <a:avLst/>
+          </a:prstGeom>
+          <a:noFill/>
+        </p:spPr>
+        <p:style>
+          <a:lnRef idx="2">
+            <a:schemeClr val="accent1">
+              <a:shade val="50000"/>
+            </a:schemeClr>
+          </a:lnRef>
+          <a:fillRef idx="1">
+            <a:schemeClr val="accent1"/>
+          </a:fillRef>
+          <a:effectRef idx="0">
+            <a:schemeClr val="accent1"/>
+          </a:effectRef>
+          <a:fontRef idx="minor">
+            <a:schemeClr val="lt1"/>
+          </a:fontRef>
+        </p:style>
+        <p:txBody>
+          <a:bodyPr rtlCol="0" anchor="ctr"/>
+          <a:lstStyle/>
+          <a:p>
+            <a:pPr algn="ctr"/>
+            <a:endParaRPr lang="en-US"/>
+          </a:p>
+        </p:txBody>
+      </p:sp>
+      <p:sp>
+        <p:nvSpPr>
+          <p:cNvPr id="33" name="Rectangle 32"/>
+          <p:cNvSpPr/>
+          <p:nvPr/>
+        </p:nvSpPr>
+        <p:spPr>
+          <a:xfrm>
+            <a:off x="1417258" y="1354974"/>
+            <a:ext cx="1060839" cy="2424815"/>
+          </a:xfrm>
+          <a:prstGeom prst="rect">
+            <a:avLst/>
+          </a:prstGeom>
+          <a:noFill/>
+        </p:spPr>
+        <p:style>
+          <a:lnRef idx="2">
+            <a:schemeClr val="accent1">
+              <a:shade val="50000"/>
+            </a:schemeClr>
+          </a:lnRef>
+          <a:fillRef idx="1">
+            <a:schemeClr val="accent1"/>
+          </a:fillRef>
+          <a:effectRef idx="0">
+            <a:schemeClr val="accent1"/>
+          </a:effectRef>
+          <a:fontRef idx="minor">
+            <a:schemeClr val="lt1"/>
+          </a:fontRef>
+        </p:style>
+        <p:txBody>
+          <a:bodyPr rtlCol="0" anchor="ctr"/>
+          <a:lstStyle/>
+          <a:p>
+            <a:pPr algn="ctr"/>
+            <a:endParaRPr lang="en-US"/>
+          </a:p>
+        </p:txBody>
+      </p:sp>
+      <p:sp>
+        <p:nvSpPr>
+          <p:cNvPr id="34" name="Rectangle 33"/>
+          <p:cNvSpPr/>
+          <p:nvPr/>
+        </p:nvSpPr>
+        <p:spPr>
+          <a:xfrm>
+            <a:off x="2467445" y="1366680"/>
+            <a:ext cx="481554" cy="2413109"/>
+          </a:xfrm>
+          <a:prstGeom prst="rect">
+            <a:avLst/>
+          </a:prstGeom>
+          <a:noFill/>
+        </p:spPr>
+        <p:style>
+          <a:lnRef idx="2">
+            <a:schemeClr val="accent1">
+              <a:shade val="50000"/>
+            </a:schemeClr>
+          </a:lnRef>
+          <a:fillRef idx="1">
+            <a:schemeClr val="accent1"/>
+          </a:fillRef>
+          <a:effectRef idx="0">
+            <a:schemeClr val="accent1"/>
+          </a:effectRef>
+          <a:fontRef idx="minor">
+            <a:schemeClr val="lt1"/>
+          </a:fontRef>
+        </p:style>
+        <p:txBody>
+          <a:bodyPr rtlCol="0" anchor="ctr"/>
+          <a:lstStyle/>
+          <a:p>
+            <a:pPr algn="ctr"/>
+            <a:endParaRPr lang="en-US"/>
+          </a:p>
+        </p:txBody>
+      </p:sp>
+      <p:sp>
+        <p:nvSpPr>
+          <p:cNvPr id="35" name="Rectangle 34"/>
+          <p:cNvSpPr/>
+          <p:nvPr/>
+        </p:nvSpPr>
+        <p:spPr>
+          <a:xfrm>
+            <a:off x="2942880" y="1359640"/>
+            <a:ext cx="402930" cy="2420150"/>
+          </a:xfrm>
+          <a:prstGeom prst="rect">
+            <a:avLst/>
+          </a:prstGeom>
+          <a:noFill/>
+        </p:spPr>
+        <p:style>
+          <a:lnRef idx="2">
+            <a:schemeClr val="accent1">
+              <a:shade val="50000"/>
+            </a:schemeClr>
+          </a:lnRef>
+          <a:fillRef idx="1">
+            <a:schemeClr val="accent1"/>
+          </a:fillRef>
+          <a:effectRef idx="0">
+            <a:schemeClr val="accent1"/>
+          </a:effectRef>
+          <a:fontRef idx="minor">
+            <a:schemeClr val="lt1"/>
+          </a:fontRef>
+        </p:style>
+        <p:txBody>
+          <a:bodyPr rtlCol="0" anchor="ctr"/>
+          <a:lstStyle/>
+          <a:p>
+            <a:pPr algn="ctr"/>
+            <a:endParaRPr lang="en-US"/>
+          </a:p>
+        </p:txBody>
+      </p:sp>
+      <p:sp>
+        <p:nvSpPr>
+          <p:cNvPr id="36" name="Rectangle 35"/>
+          <p:cNvSpPr/>
+          <p:nvPr/>
+        </p:nvSpPr>
+        <p:spPr>
+          <a:xfrm>
+            <a:off x="3335544" y="1366680"/>
+            <a:ext cx="1050087" cy="2417653"/>
+          </a:xfrm>
+          <a:prstGeom prst="rect">
+            <a:avLst/>
+          </a:prstGeom>
+          <a:noFill/>
+        </p:spPr>
+        <p:style>
+          <a:lnRef idx="2">
+            <a:schemeClr val="accent1">
+              <a:shade val="50000"/>
+            </a:schemeClr>
+          </a:lnRef>
+          <a:fillRef idx="1">
+            <a:schemeClr val="accent1"/>
+          </a:fillRef>
+          <a:effectRef idx="0">
+            <a:schemeClr val="accent1"/>
+          </a:effectRef>
+          <a:fontRef idx="minor">
+            <a:schemeClr val="lt1"/>
+          </a:fontRef>
+        </p:style>
+        <p:txBody>
+          <a:bodyPr rtlCol="0" anchor="ctr"/>
+          <a:lstStyle/>
+          <a:p>
+            <a:pPr algn="ctr"/>
+            <a:endParaRPr lang="en-US"/>
+          </a:p>
+        </p:txBody>
+      </p:sp>
+      <p:sp>
+        <p:nvSpPr>
+          <p:cNvPr id="6" name="TextBox 5"/>
+          <p:cNvSpPr txBox="1"/>
+          <p:nvPr/>
+        </p:nvSpPr>
+        <p:spPr>
+          <a:xfrm>
+            <a:off x="1074047" y="997348"/>
+            <a:ext cx="249721" cy="369332"/>
+          </a:xfrm>
+          <a:prstGeom prst="rect">
+            <a:avLst/>
+          </a:prstGeom>
+          <a:noFill/>
+        </p:spPr>
+        <p:txBody>
+          <a:bodyPr wrap="square" rtlCol="0">
+            <a:spAutoFit/>
+          </a:bodyPr>
+          <a:lstStyle/>
+          <a:p>
+            <a:r>
+              <a:rPr lang="en-US" dirty="0" smtClean="0"/>
+              <a:t>1</a:t>
+            </a:r>
+            <a:endParaRPr lang="en-US" dirty="0"/>
+          </a:p>
+        </p:txBody>
+      </p:sp>
+      <p:sp>
+        <p:nvSpPr>
+          <p:cNvPr id="37" name="TextBox 36"/>
+          <p:cNvSpPr txBox="1"/>
+          <p:nvPr/>
+        </p:nvSpPr>
+        <p:spPr>
+          <a:xfrm>
+            <a:off x="1728728" y="1000242"/>
+            <a:ext cx="249721" cy="369332"/>
+          </a:xfrm>
+          <a:prstGeom prst="rect">
+            <a:avLst/>
+          </a:prstGeom>
+          <a:noFill/>
+        </p:spPr>
+        <p:txBody>
+          <a:bodyPr wrap="square" rtlCol="0">
+            <a:spAutoFit/>
+          </a:bodyPr>
+          <a:lstStyle/>
+          <a:p>
+            <a:r>
+              <a:rPr lang="en-US" dirty="0" smtClean="0"/>
+              <a:t>2</a:t>
+            </a:r>
+            <a:endParaRPr lang="en-US" dirty="0"/>
+          </a:p>
+        </p:txBody>
+      </p:sp>
+      <p:sp>
+        <p:nvSpPr>
+          <p:cNvPr id="38" name="TextBox 37"/>
+          <p:cNvSpPr txBox="1"/>
+          <p:nvPr/>
+        </p:nvSpPr>
+        <p:spPr>
+          <a:xfrm>
+            <a:off x="2523103" y="982925"/>
+            <a:ext cx="249721" cy="369332"/>
+          </a:xfrm>
+          <a:prstGeom prst="rect">
+            <a:avLst/>
+          </a:prstGeom>
+          <a:noFill/>
+        </p:spPr>
+        <p:txBody>
+          <a:bodyPr wrap="square" rtlCol="0">
+            <a:spAutoFit/>
+          </a:bodyPr>
+          <a:lstStyle/>
+          <a:p>
+            <a:r>
+              <a:rPr lang="en-US" dirty="0" smtClean="0"/>
+              <a:t>3</a:t>
+            </a:r>
+            <a:endParaRPr lang="en-US" dirty="0"/>
+          </a:p>
+        </p:txBody>
+      </p:sp>
+      <p:sp>
+        <p:nvSpPr>
+          <p:cNvPr id="39" name="TextBox 38"/>
+          <p:cNvSpPr txBox="1"/>
+          <p:nvPr/>
+        </p:nvSpPr>
+        <p:spPr>
+          <a:xfrm>
+            <a:off x="2960886" y="981391"/>
+            <a:ext cx="249721" cy="369332"/>
+          </a:xfrm>
+          <a:prstGeom prst="rect">
+            <a:avLst/>
+          </a:prstGeom>
+          <a:noFill/>
+        </p:spPr>
+        <p:txBody>
+          <a:bodyPr wrap="square" rtlCol="0">
+            <a:spAutoFit/>
+          </a:bodyPr>
+          <a:lstStyle/>
+          <a:p>
+            <a:r>
+              <a:rPr lang="en-US" dirty="0" smtClean="0"/>
+              <a:t>2</a:t>
+            </a:r>
+            <a:endParaRPr lang="en-US" dirty="0"/>
+          </a:p>
+        </p:txBody>
+      </p:sp>
+      <p:sp>
+        <p:nvSpPr>
+          <p:cNvPr id="40" name="TextBox 39"/>
+          <p:cNvSpPr txBox="1"/>
+          <p:nvPr/>
+        </p:nvSpPr>
+        <p:spPr>
+          <a:xfrm>
+            <a:off x="3544679" y="982925"/>
+            <a:ext cx="249721" cy="369332"/>
+          </a:xfrm>
+          <a:prstGeom prst="rect">
+            <a:avLst/>
+          </a:prstGeom>
+          <a:noFill/>
+        </p:spPr>
+        <p:txBody>
+          <a:bodyPr wrap="square" rtlCol="0">
+            <a:spAutoFit/>
+          </a:bodyPr>
+          <a:lstStyle/>
+          <a:p>
+            <a:r>
+              <a:rPr lang="en-US" dirty="0" smtClean="0"/>
+              <a:t>1</a:t>
+            </a:r>
+            <a:endParaRPr lang="en-US" dirty="0"/>
+          </a:p>
+        </p:txBody>
+      </p:sp>
+      <p:sp>
+        <p:nvSpPr>
+          <p:cNvPr id="41" name="TextBox 40"/>
+          <p:cNvSpPr txBox="1"/>
+          <p:nvPr/>
+        </p:nvSpPr>
+        <p:spPr>
+          <a:xfrm>
+            <a:off x="2583361" y="4785367"/>
+            <a:ext cx="249721" cy="369332"/>
+          </a:xfrm>
+          <a:prstGeom prst="rect">
+            <a:avLst/>
+          </a:prstGeom>
+          <a:noFill/>
+        </p:spPr>
+        <p:txBody>
+          <a:bodyPr wrap="square" rtlCol="0">
+            <a:spAutoFit/>
+          </a:bodyPr>
+          <a:lstStyle/>
+          <a:p>
+            <a:r>
+              <a:rPr lang="en-US" dirty="0" smtClean="0"/>
+              <a:t>3</a:t>
+            </a:r>
+            <a:endParaRPr lang="en-US" dirty="0"/>
+          </a:p>
+        </p:txBody>
+      </p:sp>
+    </p:spTree>
+    <p:extLst>
+      <p:ext uri="{BB962C8B-B14F-4D97-AF65-F5344CB8AC3E}">
+        <p14:creationId xmlns:p14="http://schemas.microsoft.com/office/powerpoint/2010/main" val="3343999880"/>
+      </p:ext>
+    </p:extLst>
+  </p:cSld>
+  <p:clrMapOvr>
+    <a:masterClrMapping/>
+  </p:clrMapOvr>
+</p:sld>
+</file>
+
+<file path=ppt/slides/slide4.xml><?xml version="1.0" encoding="utf-8"?>
+<p:sld xmlns:a="http://schemas.openxmlformats.org/drawingml/2006/main" xmlns:r="http://schemas.openxmlformats.org/officeDocument/2006/relationships" xmlns:p="http://schemas.openxmlformats.org/presentationml/2006/main">
+  <p:cSld>
+    <p:spTree>
+      <p:nvGrpSpPr>
+        <p:cNvPr id="1" name=""/>
+        <p:cNvGrpSpPr/>
+        <p:nvPr/>
+      </p:nvGrpSpPr>
+      <p:grpSpPr>
+        <a:xfrm>
+          <a:off x="0" y="0"/>
+          <a:ext cx="0" cy="0"/>
+          <a:chOff x="0" y="0"/>
+          <a:chExt cx="0" cy="0"/>
+        </a:xfrm>
+      </p:grpSpPr>
+      <p:sp>
+        <p:nvSpPr>
+          <p:cNvPr id="8" name="Rectangle 7"/>
+          <p:cNvSpPr/>
+          <p:nvPr/>
+        </p:nvSpPr>
+        <p:spPr>
+          <a:xfrm>
+            <a:off x="637082" y="406653"/>
+            <a:ext cx="6941975" cy="3377681"/>
+          </a:xfrm>
+          <a:prstGeom prst="rect">
+            <a:avLst/>
+          </a:prstGeom>
+          <a:noFill/>
+          <a:ln>
+            <a:solidFill>
+              <a:schemeClr val="tx1"/>
+            </a:solidFill>
+          </a:ln>
+        </p:spPr>
+        <p:style>
+          <a:lnRef idx="2">
+            <a:schemeClr val="accent1">
+              <a:shade val="50000"/>
+            </a:schemeClr>
+          </a:lnRef>
+          <a:fillRef idx="1">
+            <a:schemeClr val="accent1"/>
+          </a:fillRef>
+          <a:effectRef idx="0">
+            <a:schemeClr val="accent1"/>
+          </a:effectRef>
+          <a:fontRef idx="minor">
+            <a:schemeClr val="lt1"/>
+          </a:fontRef>
+        </p:style>
+        <p:txBody>
+          <a:bodyPr rtlCol="0" anchor="ctr"/>
+          <a:lstStyle/>
+          <a:p>
+            <a:pPr algn="ctr"/>
+            <a:endParaRPr lang="en-US"/>
+          </a:p>
+        </p:txBody>
+      </p:sp>
+      <p:cxnSp>
+        <p:nvCxnSpPr>
+          <p:cNvPr id="5" name="Straight Arrow Connector 4"/>
+          <p:cNvCxnSpPr/>
+          <p:nvPr/>
+        </p:nvCxnSpPr>
+        <p:spPr>
+          <a:xfrm>
+            <a:off x="1010081" y="1787575"/>
+            <a:ext cx="1928552" cy="8313"/>
+          </a:xfrm>
+          <a:prstGeom prst="straightConnector1">
+            <a:avLst/>
+          </a:prstGeom>
+          <a:ln w="28575" cap="sq">
+            <a:solidFill>
+              <a:schemeClr val="tx1">
+                <a:alpha val="93000"/>
+              </a:schemeClr>
+            </a:solidFill>
+            <a:bevel/>
+            <a:headEnd type="diamond" w="lg" len="lg"/>
+            <a:tailEnd type="diamond" w="lg" len="lg"/>
+          </a:ln>
+        </p:spPr>
+        <p:style>
+          <a:lnRef idx="1">
+            <a:schemeClr val="accent1"/>
+          </a:lnRef>
+          <a:fillRef idx="0">
+            <a:schemeClr val="accent1"/>
+          </a:fillRef>
+          <a:effectRef idx="0">
+            <a:schemeClr val="accent1"/>
+          </a:effectRef>
+          <a:fontRef idx="minor">
+            <a:schemeClr val="tx1"/>
+          </a:fontRef>
+        </p:style>
+      </p:cxnSp>
+      <p:sp>
+        <p:nvSpPr>
+          <p:cNvPr id="9" name="TextBox 8"/>
+          <p:cNvSpPr txBox="1"/>
+          <p:nvPr/>
+        </p:nvSpPr>
+        <p:spPr>
+          <a:xfrm>
+            <a:off x="1483566" y="1436913"/>
+            <a:ext cx="1119674" cy="369332"/>
+          </a:xfrm>
+          <a:prstGeom prst="rect">
+            <a:avLst/>
+          </a:prstGeom>
+          <a:noFill/>
+        </p:spPr>
+        <p:txBody>
+          <a:bodyPr wrap="square" rtlCol="0">
+            <a:spAutoFit/>
+          </a:bodyPr>
+          <a:lstStyle/>
+          <a:p>
+            <a:r>
+              <a:rPr lang="en-US" dirty="0" smtClean="0"/>
+              <a:t>Cohort 1</a:t>
+            </a:r>
+            <a:endParaRPr lang="en-US" dirty="0"/>
+          </a:p>
+        </p:txBody>
+      </p:sp>
+      <p:cxnSp>
+        <p:nvCxnSpPr>
+          <p:cNvPr id="10" name="Straight Arrow Connector 9"/>
+          <p:cNvCxnSpPr/>
+          <p:nvPr/>
+        </p:nvCxnSpPr>
+        <p:spPr>
+          <a:xfrm>
+            <a:off x="2478097" y="2552694"/>
+            <a:ext cx="1928552" cy="8313"/>
+          </a:xfrm>
+          <a:prstGeom prst="straightConnector1">
+            <a:avLst/>
+          </a:prstGeom>
+          <a:ln w="28575" cap="sq">
+            <a:solidFill>
+              <a:schemeClr val="tx1">
+                <a:alpha val="93000"/>
+              </a:schemeClr>
+            </a:solidFill>
+            <a:bevel/>
+            <a:headEnd type="diamond" w="lg" len="lg"/>
+            <a:tailEnd type="diamond" w="lg" len="lg"/>
+          </a:ln>
+        </p:spPr>
+        <p:style>
+          <a:lnRef idx="1">
+            <a:schemeClr val="accent1"/>
+          </a:lnRef>
+          <a:fillRef idx="0">
+            <a:schemeClr val="accent1"/>
+          </a:fillRef>
+          <a:effectRef idx="0">
+            <a:schemeClr val="accent1"/>
+          </a:effectRef>
+          <a:fontRef idx="minor">
+            <a:schemeClr val="tx1"/>
+          </a:fontRef>
+        </p:style>
+      </p:cxnSp>
+      <p:sp>
+        <p:nvSpPr>
+          <p:cNvPr id="11" name="TextBox 10"/>
+          <p:cNvSpPr txBox="1"/>
+          <p:nvPr/>
+        </p:nvSpPr>
+        <p:spPr>
+          <a:xfrm>
+            <a:off x="2951582" y="2202032"/>
+            <a:ext cx="1119674" cy="369332"/>
+          </a:xfrm>
+          <a:prstGeom prst="rect">
+            <a:avLst/>
+          </a:prstGeom>
+          <a:noFill/>
+        </p:spPr>
+        <p:txBody>
+          <a:bodyPr wrap="square" rtlCol="0">
+            <a:spAutoFit/>
+          </a:bodyPr>
+          <a:lstStyle/>
+          <a:p>
+            <a:r>
+              <a:rPr lang="en-US" dirty="0" smtClean="0"/>
+              <a:t>Cohort 2</a:t>
+            </a:r>
+            <a:endParaRPr lang="en-US" dirty="0"/>
+          </a:p>
+        </p:txBody>
+      </p:sp>
+      <p:sp>
+        <p:nvSpPr>
+          <p:cNvPr id="15" name="TextBox 14"/>
+          <p:cNvSpPr txBox="1"/>
+          <p:nvPr/>
+        </p:nvSpPr>
+        <p:spPr>
+          <a:xfrm>
+            <a:off x="709127" y="46652"/>
+            <a:ext cx="1614195" cy="369332"/>
+          </a:xfrm>
+          <a:prstGeom prst="rect">
+            <a:avLst/>
+          </a:prstGeom>
+          <a:noFill/>
+        </p:spPr>
+        <p:txBody>
+          <a:bodyPr wrap="square" rtlCol="0">
+            <a:spAutoFit/>
+          </a:bodyPr>
+          <a:lstStyle/>
+          <a:p>
+            <a:r>
+              <a:rPr lang="en-US" dirty="0" smtClean="0"/>
+              <a:t>Input</a:t>
+            </a:r>
+            <a:endParaRPr lang="en-US" dirty="0"/>
+          </a:p>
+        </p:txBody>
+      </p:sp>
+      <p:sp>
+        <p:nvSpPr>
+          <p:cNvPr id="16" name="TextBox 15"/>
+          <p:cNvSpPr txBox="1"/>
+          <p:nvPr/>
+        </p:nvSpPr>
+        <p:spPr>
+          <a:xfrm>
+            <a:off x="555946" y="3930214"/>
+            <a:ext cx="1614195" cy="369332"/>
+          </a:xfrm>
+          <a:prstGeom prst="rect">
+            <a:avLst/>
+          </a:prstGeom>
+          <a:noFill/>
+        </p:spPr>
+        <p:txBody>
+          <a:bodyPr wrap="square" rtlCol="0">
+            <a:spAutoFit/>
+          </a:bodyPr>
+          <a:lstStyle/>
+          <a:p>
+            <a:r>
+              <a:rPr lang="en-US" dirty="0" smtClean="0"/>
+              <a:t>Output</a:t>
+            </a:r>
+            <a:endParaRPr lang="en-US" dirty="0"/>
+          </a:p>
+        </p:txBody>
+      </p:sp>
+      <p:sp>
+        <p:nvSpPr>
+          <p:cNvPr id="17" name="TextBox 16"/>
+          <p:cNvSpPr txBox="1"/>
+          <p:nvPr/>
+        </p:nvSpPr>
+        <p:spPr>
+          <a:xfrm>
+            <a:off x="814871" y="1940773"/>
+            <a:ext cx="668695" cy="216133"/>
+          </a:xfrm>
+          <a:prstGeom prst="rect">
+            <a:avLst/>
+          </a:prstGeom>
+          <a:noFill/>
+        </p:spPr>
+        <p:txBody>
+          <a:bodyPr wrap="square" rtlCol="0">
+            <a:spAutoFit/>
+          </a:bodyPr>
+          <a:lstStyle/>
+          <a:p>
+            <a:r>
+              <a:rPr lang="en-US" sz="800" dirty="0" smtClean="0"/>
+              <a:t>Jan/1/2022</a:t>
+            </a:r>
+            <a:endParaRPr lang="en-US" sz="800" dirty="0"/>
+          </a:p>
+        </p:txBody>
+      </p:sp>
+      <p:sp>
+        <p:nvSpPr>
+          <p:cNvPr id="18" name="TextBox 17"/>
+          <p:cNvSpPr txBox="1"/>
+          <p:nvPr/>
+        </p:nvSpPr>
+        <p:spPr>
+          <a:xfrm>
+            <a:off x="2816284" y="1946425"/>
+            <a:ext cx="887967" cy="215444"/>
+          </a:xfrm>
+          <a:prstGeom prst="rect">
+            <a:avLst/>
+          </a:prstGeom>
+          <a:noFill/>
+        </p:spPr>
+        <p:txBody>
+          <a:bodyPr wrap="square" rtlCol="0">
+            <a:spAutoFit/>
+          </a:bodyPr>
+          <a:lstStyle/>
+          <a:p>
+            <a:r>
+              <a:rPr lang="en-US" sz="800" dirty="0" smtClean="0"/>
+              <a:t>Mar/1/2022</a:t>
+            </a:r>
+            <a:endParaRPr lang="en-US" sz="800" dirty="0"/>
+          </a:p>
+        </p:txBody>
+      </p:sp>
+      <p:sp>
+        <p:nvSpPr>
+          <p:cNvPr id="19" name="TextBox 18"/>
+          <p:cNvSpPr txBox="1"/>
+          <p:nvPr/>
+        </p:nvSpPr>
+        <p:spPr>
+          <a:xfrm>
+            <a:off x="2235189" y="2676882"/>
+            <a:ext cx="843911" cy="215444"/>
+          </a:xfrm>
+          <a:prstGeom prst="rect">
+            <a:avLst/>
+          </a:prstGeom>
+          <a:noFill/>
+        </p:spPr>
+        <p:txBody>
+          <a:bodyPr wrap="square" rtlCol="0">
+            <a:spAutoFit/>
+          </a:bodyPr>
+          <a:lstStyle/>
+          <a:p>
+            <a:r>
+              <a:rPr lang="en-US" sz="800" dirty="0" smtClean="0"/>
+              <a:t>Feb/10/2022</a:t>
+            </a:r>
+            <a:endParaRPr lang="en-US" sz="800" dirty="0"/>
+          </a:p>
+        </p:txBody>
+      </p:sp>
+      <p:sp>
+        <p:nvSpPr>
+          <p:cNvPr id="20" name="TextBox 19"/>
+          <p:cNvSpPr txBox="1"/>
+          <p:nvPr/>
+        </p:nvSpPr>
+        <p:spPr>
+          <a:xfrm>
+            <a:off x="4131140" y="2640898"/>
+            <a:ext cx="926050" cy="215444"/>
+          </a:xfrm>
+          <a:prstGeom prst="rect">
+            <a:avLst/>
+          </a:prstGeom>
+          <a:noFill/>
+        </p:spPr>
+        <p:txBody>
+          <a:bodyPr wrap="square" rtlCol="0">
+            <a:spAutoFit/>
+          </a:bodyPr>
+          <a:lstStyle/>
+          <a:p>
+            <a:r>
+              <a:rPr lang="en-US" sz="800" dirty="0" smtClean="0"/>
+              <a:t>May/10/2022</a:t>
+            </a:r>
+            <a:endParaRPr lang="en-US" sz="800" dirty="0"/>
+          </a:p>
+        </p:txBody>
+      </p:sp>
+      <p:sp>
+        <p:nvSpPr>
+          <p:cNvPr id="23" name="Rectangle 22"/>
+          <p:cNvSpPr/>
+          <p:nvPr/>
+        </p:nvSpPr>
+        <p:spPr>
+          <a:xfrm>
+            <a:off x="637082" y="4328984"/>
+            <a:ext cx="6941975" cy="1547346"/>
+          </a:xfrm>
+          <a:prstGeom prst="rect">
+            <a:avLst/>
+          </a:prstGeom>
+          <a:noFill/>
+          <a:ln>
+            <a:solidFill>
+              <a:schemeClr val="tx1"/>
+            </a:solidFill>
+          </a:ln>
+        </p:spPr>
+        <p:style>
+          <a:lnRef idx="2">
+            <a:schemeClr val="accent1">
+              <a:shade val="50000"/>
+            </a:schemeClr>
+          </a:lnRef>
+          <a:fillRef idx="1">
+            <a:schemeClr val="accent1"/>
+          </a:fillRef>
+          <a:effectRef idx="0">
+            <a:schemeClr val="accent1"/>
+          </a:effectRef>
+          <a:fontRef idx="minor">
+            <a:schemeClr val="lt1"/>
+          </a:fontRef>
+        </p:style>
+        <p:txBody>
+          <a:bodyPr rtlCol="0" anchor="ctr"/>
+          <a:lstStyle/>
+          <a:p>
+            <a:pPr algn="ctr"/>
+            <a:endParaRPr lang="en-US"/>
+          </a:p>
+        </p:txBody>
+      </p:sp>
+      <p:cxnSp>
+        <p:nvCxnSpPr>
+          <p:cNvPr id="24" name="Straight Arrow Connector 23"/>
+          <p:cNvCxnSpPr/>
+          <p:nvPr/>
+        </p:nvCxnSpPr>
+        <p:spPr>
+          <a:xfrm>
+            <a:off x="1068273" y="5154699"/>
+            <a:ext cx="1399172" cy="0"/>
+          </a:xfrm>
+          <a:prstGeom prst="straightConnector1">
+            <a:avLst/>
+          </a:prstGeom>
+          <a:ln w="28575" cap="sq">
+            <a:solidFill>
+              <a:schemeClr val="tx1">
+                <a:alpha val="93000"/>
+              </a:schemeClr>
+            </a:solidFill>
+            <a:bevel/>
+            <a:headEnd type="diamond" w="lg" len="lg"/>
+            <a:tailEnd type="diamond" w="lg" len="lg"/>
+          </a:ln>
+        </p:spPr>
+        <p:style>
+          <a:lnRef idx="1">
+            <a:schemeClr val="accent1"/>
+          </a:lnRef>
+          <a:fillRef idx="0">
+            <a:schemeClr val="accent1"/>
+          </a:fillRef>
+          <a:effectRef idx="0">
+            <a:schemeClr val="accent1"/>
+          </a:effectRef>
+          <a:fontRef idx="minor">
+            <a:schemeClr val="tx1"/>
+          </a:fontRef>
+        </p:style>
+      </p:cxnSp>
+      <p:sp>
+        <p:nvSpPr>
+          <p:cNvPr id="25" name="TextBox 24"/>
+          <p:cNvSpPr txBox="1"/>
+          <p:nvPr/>
+        </p:nvSpPr>
+        <p:spPr>
+          <a:xfrm>
+            <a:off x="1231622" y="5130994"/>
+            <a:ext cx="1119674" cy="369332"/>
+          </a:xfrm>
+          <a:prstGeom prst="rect">
+            <a:avLst/>
+          </a:prstGeom>
+          <a:noFill/>
+        </p:spPr>
+        <p:txBody>
+          <a:bodyPr wrap="square" rtlCol="0">
+            <a:spAutoFit/>
+          </a:bodyPr>
+          <a:lstStyle/>
+          <a:p>
+            <a:r>
+              <a:rPr lang="en-US" dirty="0" smtClean="0"/>
+              <a:t>Cohort </a:t>
+            </a:r>
+            <a:r>
+              <a:rPr lang="en-US" dirty="0" smtClean="0"/>
+              <a:t>3</a:t>
+            </a:r>
+            <a:endParaRPr lang="en-US" dirty="0"/>
+          </a:p>
+        </p:txBody>
+      </p:sp>
+      <p:sp>
+        <p:nvSpPr>
+          <p:cNvPr id="32" name="TextBox 31"/>
+          <p:cNvSpPr txBox="1"/>
+          <p:nvPr/>
+        </p:nvSpPr>
+        <p:spPr>
+          <a:xfrm>
+            <a:off x="814871" y="5478570"/>
+            <a:ext cx="809077" cy="215444"/>
+          </a:xfrm>
+          <a:prstGeom prst="rect">
+            <a:avLst/>
+          </a:prstGeom>
+          <a:noFill/>
+        </p:spPr>
+        <p:txBody>
+          <a:bodyPr wrap="square" rtlCol="0">
+            <a:spAutoFit/>
+          </a:bodyPr>
+          <a:lstStyle/>
+          <a:p>
+            <a:r>
+              <a:rPr lang="en-US" sz="800" dirty="0" smtClean="0"/>
+              <a:t>Jan</a:t>
+            </a:r>
+            <a:r>
+              <a:rPr lang="en-US" sz="800" dirty="0" smtClean="0"/>
+              <a:t>/1/2022</a:t>
+            </a:r>
+            <a:endParaRPr lang="en-US" sz="800" dirty="0"/>
+          </a:p>
+        </p:txBody>
+      </p:sp>
+      <p:sp>
+        <p:nvSpPr>
+          <p:cNvPr id="45" name="TextBox 44"/>
+          <p:cNvSpPr txBox="1"/>
+          <p:nvPr/>
+        </p:nvSpPr>
+        <p:spPr>
+          <a:xfrm>
+            <a:off x="2170141" y="5475185"/>
+            <a:ext cx="926050" cy="215444"/>
+          </a:xfrm>
+          <a:prstGeom prst="rect">
+            <a:avLst/>
+          </a:prstGeom>
+          <a:noFill/>
+        </p:spPr>
+        <p:txBody>
+          <a:bodyPr wrap="square" rtlCol="0">
+            <a:spAutoFit/>
+          </a:bodyPr>
+          <a:lstStyle/>
+          <a:p>
+            <a:r>
+              <a:rPr lang="en-US" sz="800" dirty="0" smtClean="0"/>
+              <a:t>Feb/10/2022</a:t>
+            </a:r>
+            <a:endParaRPr lang="en-US" sz="800" dirty="0"/>
+          </a:p>
+        </p:txBody>
+      </p:sp>
+      <p:sp>
+        <p:nvSpPr>
+          <p:cNvPr id="28" name="TextBox 27"/>
+          <p:cNvSpPr txBox="1"/>
+          <p:nvPr/>
+        </p:nvSpPr>
+        <p:spPr>
+          <a:xfrm>
+            <a:off x="1063690" y="513184"/>
+            <a:ext cx="5122506" cy="369332"/>
+          </a:xfrm>
+          <a:prstGeom prst="rect">
+            <a:avLst/>
+          </a:prstGeom>
+          <a:noFill/>
+        </p:spPr>
+        <p:txBody>
+          <a:bodyPr wrap="square" rtlCol="0">
+            <a:spAutoFit/>
+          </a:bodyPr>
+          <a:lstStyle/>
+          <a:p>
+            <a:r>
+              <a:rPr lang="en-US" dirty="0" smtClean="0"/>
+              <a:t>Cohort </a:t>
+            </a:r>
+            <a:r>
+              <a:rPr lang="en-US" dirty="0" smtClean="0"/>
+              <a:t>Minus:</a:t>
+            </a:r>
+            <a:endParaRPr lang="en-US" dirty="0"/>
+          </a:p>
+        </p:txBody>
+      </p:sp>
+      <p:sp>
+        <p:nvSpPr>
+          <p:cNvPr id="33" name="Rectangle 32"/>
+          <p:cNvSpPr/>
+          <p:nvPr/>
+        </p:nvSpPr>
+        <p:spPr>
+          <a:xfrm>
+            <a:off x="1005834" y="1354974"/>
+            <a:ext cx="1472263" cy="2424815"/>
+          </a:xfrm>
+          <a:prstGeom prst="rect">
+            <a:avLst/>
+          </a:prstGeom>
+          <a:noFill/>
+        </p:spPr>
+        <p:style>
+          <a:lnRef idx="2">
+            <a:schemeClr val="accent1">
+              <a:shade val="50000"/>
+            </a:schemeClr>
+          </a:lnRef>
+          <a:fillRef idx="1">
+            <a:schemeClr val="accent1"/>
+          </a:fillRef>
+          <a:effectRef idx="0">
+            <a:schemeClr val="accent1"/>
+          </a:effectRef>
+          <a:fontRef idx="minor">
+            <a:schemeClr val="lt1"/>
+          </a:fontRef>
+        </p:style>
+        <p:txBody>
+          <a:bodyPr rtlCol="0" anchor="ctr"/>
+          <a:lstStyle/>
+          <a:p>
+            <a:pPr algn="ctr"/>
+            <a:endParaRPr lang="en-US"/>
+          </a:p>
+        </p:txBody>
+      </p:sp>
+      <p:sp>
+        <p:nvSpPr>
+          <p:cNvPr id="34" name="Rectangle 33"/>
+          <p:cNvSpPr/>
+          <p:nvPr/>
+        </p:nvSpPr>
+        <p:spPr>
+          <a:xfrm>
+            <a:off x="2467445" y="1352258"/>
+            <a:ext cx="481554" cy="2427532"/>
+          </a:xfrm>
+          <a:prstGeom prst="rect">
+            <a:avLst/>
+          </a:prstGeom>
+          <a:noFill/>
+        </p:spPr>
+        <p:style>
+          <a:lnRef idx="2">
+            <a:schemeClr val="accent1">
+              <a:shade val="50000"/>
+            </a:schemeClr>
+          </a:lnRef>
+          <a:fillRef idx="1">
+            <a:schemeClr val="accent1"/>
+          </a:fillRef>
+          <a:effectRef idx="0">
+            <a:schemeClr val="accent1"/>
+          </a:effectRef>
+          <a:fontRef idx="minor">
+            <a:schemeClr val="lt1"/>
+          </a:fontRef>
+        </p:style>
+        <p:txBody>
+          <a:bodyPr rtlCol="0" anchor="ctr"/>
+          <a:lstStyle/>
+          <a:p>
+            <a:pPr algn="ctr"/>
+            <a:endParaRPr lang="en-US"/>
+          </a:p>
+        </p:txBody>
+      </p:sp>
+      <p:sp>
+        <p:nvSpPr>
+          <p:cNvPr id="36" name="Rectangle 35"/>
+          <p:cNvSpPr/>
+          <p:nvPr/>
+        </p:nvSpPr>
+        <p:spPr>
+          <a:xfrm>
+            <a:off x="2938634" y="1354974"/>
+            <a:ext cx="1446998" cy="2429359"/>
+          </a:xfrm>
+          <a:prstGeom prst="rect">
+            <a:avLst/>
+          </a:prstGeom>
+          <a:noFill/>
+          <a:ln>
+            <a:prstDash val="sysDot"/>
+          </a:ln>
+        </p:spPr>
+        <p:style>
+          <a:lnRef idx="2">
+            <a:schemeClr val="accent1">
+              <a:shade val="50000"/>
+            </a:schemeClr>
+          </a:lnRef>
+          <a:fillRef idx="1">
+            <a:schemeClr val="accent1"/>
+          </a:fillRef>
+          <a:effectRef idx="0">
+            <a:schemeClr val="accent1"/>
+          </a:effectRef>
+          <a:fontRef idx="minor">
+            <a:schemeClr val="lt1"/>
+          </a:fontRef>
+        </p:style>
+        <p:txBody>
+          <a:bodyPr rtlCol="0" anchor="ctr"/>
+          <a:lstStyle/>
+          <a:p>
+            <a:pPr algn="ctr"/>
+            <a:endParaRPr lang="en-US"/>
+          </a:p>
+        </p:txBody>
+      </p:sp>
+      <p:sp>
+        <p:nvSpPr>
+          <p:cNvPr id="6" name="TextBox 5"/>
+          <p:cNvSpPr txBox="1"/>
+          <p:nvPr/>
+        </p:nvSpPr>
+        <p:spPr>
+          <a:xfrm>
+            <a:off x="1601823" y="997348"/>
+            <a:ext cx="249721" cy="369332"/>
+          </a:xfrm>
+          <a:prstGeom prst="rect">
+            <a:avLst/>
+          </a:prstGeom>
+          <a:noFill/>
+        </p:spPr>
+        <p:txBody>
+          <a:bodyPr wrap="square" rtlCol="0">
+            <a:spAutoFit/>
+          </a:bodyPr>
+          <a:lstStyle/>
+          <a:p>
+            <a:r>
+              <a:rPr lang="en-US" dirty="0" smtClean="0"/>
+              <a:t>1</a:t>
+            </a:r>
+            <a:endParaRPr lang="en-US" dirty="0"/>
+          </a:p>
+        </p:txBody>
+      </p:sp>
+      <p:sp>
+        <p:nvSpPr>
+          <p:cNvPr id="38" name="TextBox 37"/>
+          <p:cNvSpPr txBox="1"/>
+          <p:nvPr/>
+        </p:nvSpPr>
+        <p:spPr>
+          <a:xfrm>
+            <a:off x="2523103" y="982925"/>
+            <a:ext cx="249721" cy="369332"/>
+          </a:xfrm>
+          <a:prstGeom prst="rect">
+            <a:avLst/>
+          </a:prstGeom>
+          <a:noFill/>
+        </p:spPr>
+        <p:txBody>
+          <a:bodyPr wrap="square" rtlCol="0">
+            <a:spAutoFit/>
+          </a:bodyPr>
+          <a:lstStyle/>
+          <a:p>
+            <a:r>
+              <a:rPr lang="en-US" dirty="0" smtClean="0"/>
+              <a:t>2</a:t>
+            </a:r>
+            <a:endParaRPr lang="en-US" dirty="0"/>
+          </a:p>
+        </p:txBody>
+      </p:sp>
+      <p:sp>
+        <p:nvSpPr>
+          <p:cNvPr id="41" name="TextBox 40"/>
+          <p:cNvSpPr txBox="1"/>
+          <p:nvPr/>
+        </p:nvSpPr>
+        <p:spPr>
+          <a:xfrm>
+            <a:off x="1465210" y="4732224"/>
+            <a:ext cx="249721" cy="369332"/>
+          </a:xfrm>
+          <a:prstGeom prst="rect">
+            <a:avLst/>
+          </a:prstGeom>
+          <a:noFill/>
+        </p:spPr>
+        <p:txBody>
+          <a:bodyPr wrap="square" rtlCol="0">
+            <a:spAutoFit/>
+          </a:bodyPr>
+          <a:lstStyle/>
+          <a:p>
+            <a:r>
+              <a:rPr lang="en-US" dirty="0" smtClean="0"/>
+              <a:t>1</a:t>
+            </a:r>
+            <a:endParaRPr lang="en-US" dirty="0"/>
+          </a:p>
+        </p:txBody>
+      </p:sp>
+      <p:sp>
+        <p:nvSpPr>
+          <p:cNvPr id="3" name="TextBox 2"/>
+          <p:cNvSpPr txBox="1"/>
+          <p:nvPr/>
+        </p:nvSpPr>
+        <p:spPr>
+          <a:xfrm>
+            <a:off x="3260267" y="1097280"/>
+            <a:ext cx="1261857" cy="461665"/>
+          </a:xfrm>
+          <a:prstGeom prst="rect">
+            <a:avLst/>
+          </a:prstGeom>
+          <a:noFill/>
+        </p:spPr>
+        <p:txBody>
+          <a:bodyPr wrap="square" rtlCol="0">
+            <a:spAutoFit/>
+          </a:bodyPr>
+          <a:lstStyle/>
+          <a:p>
+            <a:r>
+              <a:rPr lang="en-US" sz="1200" dirty="0" smtClean="0"/>
+              <a:t>Removed by intersect</a:t>
+            </a:r>
+            <a:endParaRPr lang="en-US" sz="1200" dirty="0"/>
+          </a:p>
+        </p:txBody>
+      </p:sp>
+    </p:spTree>
+    <p:extLst>
+      <p:ext uri="{BB962C8B-B14F-4D97-AF65-F5344CB8AC3E}">
+        <p14:creationId xmlns:p14="http://schemas.microsoft.com/office/powerpoint/2010/main" val="182041440"/>
+      </p:ext>
+    </p:extLst>
+  </p:cSld>
+  <p:clrMapOvr>
+    <a:masterClrMapping/>
+  </p:clrMapOvr>
+</p:sld>
+</file>
+
 <file path=ppt/theme/theme1.xml><?xml version="1.0" encoding="utf-8"?>
 <a:theme xmlns:a="http://schemas.openxmlformats.org/drawingml/2006/main" name="Office Theme">
   <a:themeElements>

</xml_diff>